<commit_message>
Updated table of functions to hmer 1.5.0
</commit_message>
<xml_diff>
--- a/table_functions.pptx
+++ b/table_functions.pptx
@@ -197,7 +197,7 @@
           <a:p>
             <a:fld id="{E15636E4-74B0-4AEE-A424-3CA9BD36D0E8}" type="datetimeFigureOut">
               <a:rPr lang="en-GB" smtClean="0"/>
-              <a:t>15/07/2022</a:t>
+              <a:t>07/06/2023</a:t>
             </a:fld>
             <a:endParaRPr lang="en-GB"/>
           </a:p>
@@ -680,7 +680,7 @@
           <a:p>
             <a:fld id="{F394B0BD-9DBF-4844-B752-AC18317F6010}" type="datetimeFigureOut">
               <a:rPr lang="en-GB" smtClean="0"/>
-              <a:t>15/07/2022</a:t>
+              <a:t>07/06/2023</a:t>
             </a:fld>
             <a:endParaRPr lang="en-GB"/>
           </a:p>
@@ -850,7 +850,7 @@
           <a:p>
             <a:fld id="{F394B0BD-9DBF-4844-B752-AC18317F6010}" type="datetimeFigureOut">
               <a:rPr lang="en-GB" smtClean="0"/>
-              <a:t>15/07/2022</a:t>
+              <a:t>07/06/2023</a:t>
             </a:fld>
             <a:endParaRPr lang="en-GB"/>
           </a:p>
@@ -1030,7 +1030,7 @@
           <a:p>
             <a:fld id="{F394B0BD-9DBF-4844-B752-AC18317F6010}" type="datetimeFigureOut">
               <a:rPr lang="en-GB" smtClean="0"/>
-              <a:t>15/07/2022</a:t>
+              <a:t>07/06/2023</a:t>
             </a:fld>
             <a:endParaRPr lang="en-GB"/>
           </a:p>
@@ -1200,7 +1200,7 @@
           <a:p>
             <a:fld id="{F394B0BD-9DBF-4844-B752-AC18317F6010}" type="datetimeFigureOut">
               <a:rPr lang="en-GB" smtClean="0"/>
-              <a:t>15/07/2022</a:t>
+              <a:t>07/06/2023</a:t>
             </a:fld>
             <a:endParaRPr lang="en-GB"/>
           </a:p>
@@ -1446,7 +1446,7 @@
           <a:p>
             <a:fld id="{F394B0BD-9DBF-4844-B752-AC18317F6010}" type="datetimeFigureOut">
               <a:rPr lang="en-GB" smtClean="0"/>
-              <a:t>15/07/2022</a:t>
+              <a:t>07/06/2023</a:t>
             </a:fld>
             <a:endParaRPr lang="en-GB"/>
           </a:p>
@@ -1678,7 +1678,7 @@
           <a:p>
             <a:fld id="{F394B0BD-9DBF-4844-B752-AC18317F6010}" type="datetimeFigureOut">
               <a:rPr lang="en-GB" smtClean="0"/>
-              <a:t>15/07/2022</a:t>
+              <a:t>07/06/2023</a:t>
             </a:fld>
             <a:endParaRPr lang="en-GB"/>
           </a:p>
@@ -2045,7 +2045,7 @@
           <a:p>
             <a:fld id="{F394B0BD-9DBF-4844-B752-AC18317F6010}" type="datetimeFigureOut">
               <a:rPr lang="en-GB" smtClean="0"/>
-              <a:t>15/07/2022</a:t>
+              <a:t>07/06/2023</a:t>
             </a:fld>
             <a:endParaRPr lang="en-GB"/>
           </a:p>
@@ -2163,7 +2163,7 @@
           <a:p>
             <a:fld id="{F394B0BD-9DBF-4844-B752-AC18317F6010}" type="datetimeFigureOut">
               <a:rPr lang="en-GB" smtClean="0"/>
-              <a:t>15/07/2022</a:t>
+              <a:t>07/06/2023</a:t>
             </a:fld>
             <a:endParaRPr lang="en-GB"/>
           </a:p>
@@ -2258,7 +2258,7 @@
           <a:p>
             <a:fld id="{F394B0BD-9DBF-4844-B752-AC18317F6010}" type="datetimeFigureOut">
               <a:rPr lang="en-GB" smtClean="0"/>
-              <a:t>15/07/2022</a:t>
+              <a:t>07/06/2023</a:t>
             </a:fld>
             <a:endParaRPr lang="en-GB"/>
           </a:p>
@@ -2535,7 +2535,7 @@
           <a:p>
             <a:fld id="{F394B0BD-9DBF-4844-B752-AC18317F6010}" type="datetimeFigureOut">
               <a:rPr lang="en-GB" smtClean="0"/>
-              <a:t>15/07/2022</a:t>
+              <a:t>07/06/2023</a:t>
             </a:fld>
             <a:endParaRPr lang="en-GB"/>
           </a:p>
@@ -2792,7 +2792,7 @@
           <a:p>
             <a:fld id="{F394B0BD-9DBF-4844-B752-AC18317F6010}" type="datetimeFigureOut">
               <a:rPr lang="en-GB" smtClean="0"/>
-              <a:t>15/07/2022</a:t>
+              <a:t>07/06/2023</a:t>
             </a:fld>
             <a:endParaRPr lang="en-GB"/>
           </a:p>
@@ -3005,7 +3005,7 @@
           <a:p>
             <a:fld id="{F394B0BD-9DBF-4844-B752-AC18317F6010}" type="datetimeFigureOut">
               <a:rPr lang="en-GB" smtClean="0"/>
-              <a:t>15/07/2022</a:t>
+              <a:t>07/06/2023</a:t>
             </a:fld>
             <a:endParaRPr lang="en-GB"/>
           </a:p>
@@ -3425,7 +3425,7 @@
           <p:nvPr>
             <p:extLst>
               <p:ext uri="{D42A27DB-BD31-4B8C-83A1-F6EECF244321}">
-                <p14:modId xmlns:p14="http://schemas.microsoft.com/office/powerpoint/2010/main" val="563620903"/>
+                <p14:modId xmlns:p14="http://schemas.microsoft.com/office/powerpoint/2010/main" val="4076262553"/>
               </p:ext>
             </p:extLst>
           </p:nvPr>
@@ -4159,7 +4159,123 @@
                           <a:ea typeface="+mn-ea"/>
                           <a:cs typeface="+mn-cs"/>
                         </a:rPr>
-                        <a:t>variance_emulator_from_data</a:t>
+                        <a:t>emulator_from_data</a:t>
+                      </a:r>
+                    </a:p>
+                    <a:p>
+                      <a:pPr marL="0" marR="0" lvl="0" indent="0" algn="l" defTabSz="914400" rtl="0" eaLnBrk="1" fontAlgn="auto" latinLnBrk="0" hangingPunct="1">
+                        <a:lnSpc>
+                          <a:spcPct val="100000"/>
+                        </a:lnSpc>
+                        <a:spcBef>
+                          <a:spcPts val="0"/>
+                        </a:spcBef>
+                        <a:spcAft>
+                          <a:spcPts val="0"/>
+                        </a:spcAft>
+                        <a:buClrTx/>
+                        <a:buSzTx/>
+                        <a:buFontTx/>
+                        <a:buNone/>
+                        <a:tabLst/>
+                        <a:defRPr/>
+                      </a:pPr>
+                      <a:r>
+                        <a:rPr lang="en-GB" sz="1800" i="1" kern="1200" noProof="1">
+                          <a:solidFill>
+                            <a:schemeClr val="dk1"/>
+                          </a:solidFill>
+                          <a:effectLst/>
+                          <a:latin typeface="+mn-lt"/>
+                          <a:ea typeface="+mn-ea"/>
+                          <a:cs typeface="+mn-cs"/>
+                        </a:rPr>
+                        <a:t>(</a:t>
+                      </a:r>
+                      <a:r>
+                        <a:rPr lang="en-GB" sz="1800" i="0" kern="1200" noProof="1">
+                          <a:solidFill>
+                            <a:schemeClr val="dk1"/>
+                          </a:solidFill>
+                          <a:effectLst/>
+                          <a:latin typeface="+mn-lt"/>
+                          <a:ea typeface="+mn-ea"/>
+                          <a:cs typeface="+mn-cs"/>
+                        </a:rPr>
+                        <a:t>setting </a:t>
+                      </a:r>
+                    </a:p>
+                    <a:p>
+                      <a:pPr marL="0" marR="0" lvl="0" indent="0" algn="l" defTabSz="914400" rtl="0" eaLnBrk="1" fontAlgn="auto" latinLnBrk="0" hangingPunct="1">
+                        <a:lnSpc>
+                          <a:spcPct val="100000"/>
+                        </a:lnSpc>
+                        <a:spcBef>
+                          <a:spcPts val="0"/>
+                        </a:spcBef>
+                        <a:spcAft>
+                          <a:spcPts val="0"/>
+                        </a:spcAft>
+                        <a:buClrTx/>
+                        <a:buSzTx/>
+                        <a:buFontTx/>
+                        <a:buNone/>
+                        <a:tabLst/>
+                        <a:defRPr/>
+                      </a:pPr>
+                      <a:r>
+                        <a:rPr lang="en-GB" sz="1800" i="1" kern="1200" noProof="1">
+                          <a:solidFill>
+                            <a:schemeClr val="dk1"/>
+                          </a:solidFill>
+                          <a:effectLst/>
+                          <a:latin typeface="+mn-lt"/>
+                          <a:ea typeface="+mn-ea"/>
+                          <a:cs typeface="+mn-cs"/>
+                        </a:rPr>
+                        <a:t>emulator_type </a:t>
+                      </a:r>
+                      <a:r>
+                        <a:rPr lang="en-GB" sz="1800" i="1" kern="1200" dirty="0">
+                          <a:solidFill>
+                            <a:schemeClr val="dk1"/>
+                          </a:solidFill>
+                          <a:effectLst/>
+                          <a:latin typeface="+mn-lt"/>
+                          <a:ea typeface="+mn-ea"/>
+                          <a:cs typeface="+mn-cs"/>
+                        </a:rPr>
+                        <a:t>=</a:t>
+                      </a:r>
+                      <a:r>
+                        <a:rPr lang="en-GB" i="1" dirty="0">
+                          <a:effectLst/>
+                        </a:rPr>
+                        <a:t> </a:t>
+                      </a:r>
+                      <a:r>
+                        <a:rPr lang="en-GB" sz="1800" i="1" kern="1200" dirty="0">
+                          <a:solidFill>
+                            <a:schemeClr val="dk1"/>
+                          </a:solidFill>
+                          <a:effectLst/>
+                          <a:latin typeface="+mn-lt"/>
+                          <a:ea typeface="+mn-ea"/>
+                          <a:cs typeface="+mn-cs"/>
+                        </a:rPr>
+                        <a:t>'variance'</a:t>
+                      </a:r>
+                      <a:r>
+                        <a:rPr lang="en-GB" sz="1800" kern="1200" dirty="0">
+                          <a:solidFill>
+                            <a:schemeClr val="dk1"/>
+                          </a:solidFill>
+                          <a:effectLst/>
+                          <a:latin typeface="+mn-lt"/>
+                          <a:ea typeface="+mn-ea"/>
+                          <a:cs typeface="+mn-cs"/>
+                        </a:rPr>
+                        <a:t>)</a:t>
                       </a:r>
                       <a:endParaRPr lang="en-GB" sz="1800" i="1" noProof="1">
                         <a:solidFill>
@@ -4932,7 +5048,7 @@
                             <a:schemeClr val="tx1"/>
                           </a:solidFill>
                         </a:rPr>
-                        <a:t>generate_new_runs</a:t>
+                        <a:t>generate_new_design</a:t>
                       </a:r>
                     </a:p>
                     <a:p>

</xml_diff>